<commit_message>
Update for day 2
</commit_message>
<xml_diff>
--- a/julia.pptx
+++ b/julia.pptx
@@ -253,7 +253,7 @@
           <a:p>
             <a:fld id="{88E6BFCE-C042-473B-8BE9-631034A08B52}" type="datetimeFigureOut">
               <a:rPr lang="en-US" smtClean="0"/>
-              <a:t>12/3/2023</a:t>
+              <a:t>12/4/2023</a:t>
             </a:fld>
             <a:endParaRPr lang="en-US"/>
           </a:p>
@@ -430,7 +430,7 @@
           <a:p>
             <a:fld id="{5B1D8361-A84C-4178-9125-259BF5977C90}" type="datetimeFigureOut">
               <a:rPr lang="en-US" smtClean="0"/>
-              <a:t>12/3/2023</a:t>
+              <a:t>12/4/2023</a:t>
             </a:fld>
             <a:endParaRPr lang="en-US"/>
           </a:p>
@@ -847,7 +847,7 @@
           <a:p>
             <a:fld id="{23505E16-22C9-4DF8-B882-34E789427D60}" type="datetime1">
               <a:rPr lang="en-US" smtClean="0"/>
-              <a:t>12/3/2023</a:t>
+              <a:t>12/4/2023</a:t>
             </a:fld>
             <a:endParaRPr lang="en-US"/>
           </a:p>
@@ -1047,7 +1047,7 @@
           <a:p>
             <a:fld id="{FE05C958-2A98-4272-808E-59FCF3C355EE}" type="datetime1">
               <a:rPr lang="en-US" smtClean="0"/>
-              <a:t>12/3/2023</a:t>
+              <a:t>12/4/2023</a:t>
             </a:fld>
             <a:endParaRPr lang="en-US"/>
           </a:p>
@@ -1257,7 +1257,7 @@
           <a:p>
             <a:fld id="{C57F9B88-8E9F-4C73-9C76-B9620CEC5FE9}" type="datetime1">
               <a:rPr lang="en-US" smtClean="0"/>
-              <a:t>12/3/2023</a:t>
+              <a:t>12/4/2023</a:t>
             </a:fld>
             <a:endParaRPr lang="en-US"/>
           </a:p>
@@ -1457,7 +1457,7 @@
           <a:p>
             <a:fld id="{A9BB1E28-D9AD-4F27-997F-0F21650D8400}" type="datetime1">
               <a:rPr lang="en-US" smtClean="0"/>
-              <a:t>12/3/2023</a:t>
+              <a:t>12/4/2023</a:t>
             </a:fld>
             <a:endParaRPr lang="en-US"/>
           </a:p>
@@ -1733,7 +1733,7 @@
           <a:p>
             <a:fld id="{65D5C786-F7E9-4D4B-B954-6072F469F919}" type="datetime1">
               <a:rPr lang="en-US" smtClean="0"/>
-              <a:t>12/3/2023</a:t>
+              <a:t>12/4/2023</a:t>
             </a:fld>
             <a:endParaRPr lang="en-US"/>
           </a:p>
@@ -2001,7 +2001,7 @@
           <a:p>
             <a:fld id="{FF8C7005-BE01-4F45-9E03-8237E82E8D70}" type="datetime1">
               <a:rPr lang="en-US" smtClean="0"/>
-              <a:t>12/3/2023</a:t>
+              <a:t>12/4/2023</a:t>
             </a:fld>
             <a:endParaRPr lang="en-US"/>
           </a:p>
@@ -2416,7 +2416,7 @@
           <a:p>
             <a:fld id="{1B8A5FD4-712E-4CFE-A87E-532ED05A4C71}" type="datetime1">
               <a:rPr lang="en-US" smtClean="0"/>
-              <a:t>12/3/2023</a:t>
+              <a:t>12/4/2023</a:t>
             </a:fld>
             <a:endParaRPr lang="en-US"/>
           </a:p>
@@ -2558,7 +2558,7 @@
           <a:p>
             <a:fld id="{28A28948-B9FE-4034-AAE9-C9C9E0B6B601}" type="datetime1">
               <a:rPr lang="en-US" smtClean="0"/>
-              <a:t>12/3/2023</a:t>
+              <a:t>12/4/2023</a:t>
             </a:fld>
             <a:endParaRPr lang="en-US"/>
           </a:p>
@@ -2671,7 +2671,7 @@
           <a:p>
             <a:fld id="{417FE7CF-5507-42F1-BA5D-497B8FBDCDEC}" type="datetime1">
               <a:rPr lang="en-US" smtClean="0"/>
-              <a:t>12/3/2023</a:t>
+              <a:t>12/4/2023</a:t>
             </a:fld>
             <a:endParaRPr lang="en-US"/>
           </a:p>
@@ -2984,7 +2984,7 @@
           <a:p>
             <a:fld id="{CC1547DB-0AA8-4510-9D8B-8EBA2104DAC1}" type="datetime1">
               <a:rPr lang="en-US" smtClean="0"/>
-              <a:t>12/3/2023</a:t>
+              <a:t>12/4/2023</a:t>
             </a:fld>
             <a:endParaRPr lang="en-US"/>
           </a:p>
@@ -3273,7 +3273,7 @@
           <a:p>
             <a:fld id="{39B0446B-A33F-45B7-95F2-2549913976FA}" type="datetime1">
               <a:rPr lang="en-US" smtClean="0"/>
-              <a:t>12/3/2023</a:t>
+              <a:t>12/4/2023</a:t>
             </a:fld>
             <a:endParaRPr lang="en-US"/>
           </a:p>
@@ -3517,7 +3517,7 @@
           <a:p>
             <a:fld id="{F1475203-DD63-48A7-823D-51F1DC59E52C}" type="datetime1">
               <a:rPr lang="en-US" smtClean="0"/>
-              <a:t>12/3/2023</a:t>
+              <a:t>12/4/2023</a:t>
             </a:fld>
             <a:endParaRPr lang="en-US"/>
           </a:p>
@@ -3972,7 +3972,11 @@
             </a:br>
             <a:r>
               <a:rPr lang="en-US" dirty="0"/>
-              <a:t>for Scientific Computing</a:t>
+              <a:t>for </a:t>
+            </a:r>
+            <a:r>
+              <a:rPr lang="en-US"/>
+              <a:t>Scientific Computing</a:t>
             </a:r>
             <a:endParaRPr lang="en-US" sz="4900" dirty="0"/>
           </a:p>
@@ -13572,8 +13576,8 @@
           </a:p>
         </p:txBody>
       </p:sp>
-      <mc:AlternateContent xmlns:mc="http://schemas.openxmlformats.org/markup-compatibility/2006">
-        <mc:Choice xmlns:a14="http://schemas.microsoft.com/office/drawing/2010/main" Requires="a14">
+      <mc:AlternateContent xmlns:mc="http://schemas.openxmlformats.org/markup-compatibility/2006" xmlns:a14="http://schemas.microsoft.com/office/drawing/2010/main">
+        <mc:Choice Requires="a14">
           <p:sp>
             <p:nvSpPr>
               <p:cNvPr id="6" name="Espace réservé du contenu 5">
@@ -13706,7 +13710,7 @@
             </p:txBody>
           </p:sp>
         </mc:Choice>
-        <mc:Fallback>
+        <mc:Fallback xmlns="">
           <p:sp>
             <p:nvSpPr>
               <p:cNvPr id="6" name="Espace réservé du contenu 5">

</xml_diff>